<commit_message>
Capital U in SU in presentation
</commit_message>
<xml_diff>
--- a/A night out at the SU.pptx
+++ b/A night out at the SU.pptx
@@ -623,7 +623,7 @@
           <a:p>
             <a:fld id="{74E56147-7E70-461E-8AFD-B3360EB81720}" type="datetimeFigureOut">
               <a:rPr lang="en-GB" smtClean="0"/>
-              <a:t>18/10/2016</a:t>
+              <a:t>19/10/2016</a:t>
             </a:fld>
             <a:endParaRPr lang="en-GB"/>
           </a:p>
@@ -924,7 +924,7 @@
           <a:p>
             <a:fld id="{74E56147-7E70-461E-8AFD-B3360EB81720}" type="datetimeFigureOut">
               <a:rPr lang="en-GB" smtClean="0"/>
-              <a:t>18/10/2016</a:t>
+              <a:t>19/10/2016</a:t>
             </a:fld>
             <a:endParaRPr lang="en-GB"/>
           </a:p>
@@ -1172,7 +1172,7 @@
           <a:p>
             <a:fld id="{74E56147-7E70-461E-8AFD-B3360EB81720}" type="datetimeFigureOut">
               <a:rPr lang="en-GB" smtClean="0"/>
-              <a:t>18/10/2016</a:t>
+              <a:t>19/10/2016</a:t>
             </a:fld>
             <a:endParaRPr lang="en-GB"/>
           </a:p>
@@ -1712,7 +1712,7 @@
           <a:p>
             <a:fld id="{74E56147-7E70-461E-8AFD-B3360EB81720}" type="datetimeFigureOut">
               <a:rPr lang="en-GB" smtClean="0"/>
-              <a:t>18/10/2016</a:t>
+              <a:t>19/10/2016</a:t>
             </a:fld>
             <a:endParaRPr lang="en-GB"/>
           </a:p>
@@ -1960,7 +1960,7 @@
           <a:p>
             <a:fld id="{74E56147-7E70-461E-8AFD-B3360EB81720}" type="datetimeFigureOut">
               <a:rPr lang="en-GB" smtClean="0"/>
-              <a:t>18/10/2016</a:t>
+              <a:t>19/10/2016</a:t>
             </a:fld>
             <a:endParaRPr lang="en-GB"/>
           </a:p>
@@ -2492,7 +2492,7 @@
           <a:p>
             <a:fld id="{74E56147-7E70-461E-8AFD-B3360EB81720}" type="datetimeFigureOut">
               <a:rPr lang="en-GB" smtClean="0"/>
-              <a:t>18/10/2016</a:t>
+              <a:t>19/10/2016</a:t>
             </a:fld>
             <a:endParaRPr lang="en-GB"/>
           </a:p>
@@ -2789,7 +2789,7 @@
           <a:p>
             <a:fld id="{74E56147-7E70-461E-8AFD-B3360EB81720}" type="datetimeFigureOut">
               <a:rPr lang="en-GB" smtClean="0"/>
-              <a:t>18/10/2016</a:t>
+              <a:t>19/10/2016</a:t>
             </a:fld>
             <a:endParaRPr lang="en-GB"/>
           </a:p>
@@ -2963,7 +2963,7 @@
           <a:p>
             <a:fld id="{74E56147-7E70-461E-8AFD-B3360EB81720}" type="datetimeFigureOut">
               <a:rPr lang="en-GB" smtClean="0"/>
-              <a:t>18/10/2016</a:t>
+              <a:t>19/10/2016</a:t>
             </a:fld>
             <a:endParaRPr lang="en-GB"/>
           </a:p>
@@ -3143,7 +3143,7 @@
           <a:p>
             <a:fld id="{74E56147-7E70-461E-8AFD-B3360EB81720}" type="datetimeFigureOut">
               <a:rPr lang="en-GB" smtClean="0"/>
-              <a:t>18/10/2016</a:t>
+              <a:t>19/10/2016</a:t>
             </a:fld>
             <a:endParaRPr lang="en-GB"/>
           </a:p>
@@ -3318,7 +3318,7 @@
           <a:p>
             <a:fld id="{74E56147-7E70-461E-8AFD-B3360EB81720}" type="datetimeFigureOut">
               <a:rPr lang="en-GB" smtClean="0"/>
-              <a:t>18/10/2016</a:t>
+              <a:t>19/10/2016</a:t>
             </a:fld>
             <a:endParaRPr lang="en-GB"/>
           </a:p>
@@ -3569,7 +3569,7 @@
           <a:p>
             <a:fld id="{74E56147-7E70-461E-8AFD-B3360EB81720}" type="datetimeFigureOut">
               <a:rPr lang="en-GB" smtClean="0"/>
-              <a:t>18/10/2016</a:t>
+              <a:t>19/10/2016</a:t>
             </a:fld>
             <a:endParaRPr lang="en-GB"/>
           </a:p>
@@ -3871,7 +3871,7 @@
           <a:p>
             <a:fld id="{74E56147-7E70-461E-8AFD-B3360EB81720}" type="datetimeFigureOut">
               <a:rPr lang="en-GB" smtClean="0"/>
-              <a:t>18/10/2016</a:t>
+              <a:t>19/10/2016</a:t>
             </a:fld>
             <a:endParaRPr lang="en-GB"/>
           </a:p>
@@ -4313,7 +4313,7 @@
           <a:p>
             <a:fld id="{74E56147-7E70-461E-8AFD-B3360EB81720}" type="datetimeFigureOut">
               <a:rPr lang="en-GB" smtClean="0"/>
-              <a:t>18/10/2016</a:t>
+              <a:t>19/10/2016</a:t>
             </a:fld>
             <a:endParaRPr lang="en-GB"/>
           </a:p>
@@ -4431,7 +4431,7 @@
           <a:p>
             <a:fld id="{74E56147-7E70-461E-8AFD-B3360EB81720}" type="datetimeFigureOut">
               <a:rPr lang="en-GB" smtClean="0"/>
-              <a:t>18/10/2016</a:t>
+              <a:t>19/10/2016</a:t>
             </a:fld>
             <a:endParaRPr lang="en-GB"/>
           </a:p>
@@ -4526,7 +4526,7 @@
           <a:p>
             <a:fld id="{74E56147-7E70-461E-8AFD-B3360EB81720}" type="datetimeFigureOut">
               <a:rPr lang="en-GB" smtClean="0"/>
-              <a:t>18/10/2016</a:t>
+              <a:t>19/10/2016</a:t>
             </a:fld>
             <a:endParaRPr lang="en-GB"/>
           </a:p>
@@ -4814,7 +4814,7 @@
           <a:p>
             <a:fld id="{74E56147-7E70-461E-8AFD-B3360EB81720}" type="datetimeFigureOut">
               <a:rPr lang="en-GB" smtClean="0"/>
-              <a:t>18/10/2016</a:t>
+              <a:t>19/10/2016</a:t>
             </a:fld>
             <a:endParaRPr lang="en-GB"/>
           </a:p>
@@ -5110,7 +5110,7 @@
           <a:p>
             <a:fld id="{74E56147-7E70-461E-8AFD-B3360EB81720}" type="datetimeFigureOut">
               <a:rPr lang="en-GB" smtClean="0"/>
-              <a:t>18/10/2016</a:t>
+              <a:t>19/10/2016</a:t>
             </a:fld>
             <a:endParaRPr lang="en-GB"/>
           </a:p>
@@ -5640,7 +5640,7 @@
           <a:p>
             <a:fld id="{74E56147-7E70-461E-8AFD-B3360EB81720}" type="datetimeFigureOut">
               <a:rPr lang="en-GB" smtClean="0"/>
-              <a:t>18/10/2016</a:t>
+              <a:t>19/10/2016</a:t>
             </a:fld>
             <a:endParaRPr lang="en-GB"/>
           </a:p>
@@ -6273,7 +6273,7 @@
           <a:lstStyle/>
           <a:p>
             <a:r>
-              <a:rPr lang="en-GB" sz="8800" b="1" dirty="0">
+              <a:rPr lang="en-GB" sz="8800" b="1" smtClean="0">
                 <a:solidFill>
                   <a:schemeClr val="accent4">
                     <a:lumMod val="75000"/>
@@ -6281,10 +6281,10 @@
                 </a:solidFill>
                 <a:latin typeface="+mj-lt"/>
               </a:rPr>
-              <a:t>Su-</a:t>
-            </a:r>
-            <a:r>
-              <a:rPr lang="en-GB" sz="8800" b="1" dirty="0" err="1">
+              <a:t>SU-</a:t>
+            </a:r>
+            <a:r>
+              <a:rPr lang="en-GB" sz="8800" b="1" dirty="0" err="1" smtClean="0">
                 <a:solidFill>
                   <a:schemeClr val="accent4">
                     <a:lumMod val="75000"/>

</xml_diff>

<commit_message>
Add git clone link to powerpoint
</commit_message>
<xml_diff>
--- a/A night out at the SU.pptx
+++ b/A night out at the SU.pptx
@@ -15,6 +15,7 @@
     <p:sldId id="266" r:id="rId9"/>
     <p:sldId id="265" r:id="rId10"/>
     <p:sldId id="260" r:id="rId11"/>
+    <p:sldId id="267" r:id="rId12"/>
   </p:sldIdLst>
   <p:sldSz cx="12192000" cy="6858000"/>
   <p:notesSz cx="6858000" cy="9144000"/>
@@ -6377,6 +6378,87 @@
 </p:sld>
 </file>
 
+<file path=ppt/slides/slide11.xml><?xml version="1.0" encoding="utf-8"?>
+<p:sld xmlns:a="http://schemas.openxmlformats.org/drawingml/2006/main" xmlns:r="http://schemas.openxmlformats.org/officeDocument/2006/relationships" xmlns:p="http://schemas.openxmlformats.org/presentationml/2006/main">
+  <p:cSld>
+    <p:spTree>
+      <p:nvGrpSpPr>
+        <p:cNvPr id="1" name=""/>
+        <p:cNvGrpSpPr/>
+        <p:nvPr/>
+      </p:nvGrpSpPr>
+      <p:grpSpPr>
+        <a:xfrm>
+          <a:off x="0" y="0"/>
+          <a:ext cx="0" cy="0"/>
+          <a:chOff x="0" y="0"/>
+          <a:chExt cx="0" cy="0"/>
+        </a:xfrm>
+      </p:grpSpPr>
+      <p:sp>
+        <p:nvSpPr>
+          <p:cNvPr id="2" name="Title 1"/>
+          <p:cNvSpPr>
+            <a:spLocks noGrp="1"/>
+          </p:cNvSpPr>
+          <p:nvPr>
+            <p:ph type="title"/>
+          </p:nvPr>
+        </p:nvSpPr>
+        <p:spPr/>
+        <p:txBody>
+          <a:bodyPr/>
+          <a:lstStyle/>
+          <a:p>
+            <a:r>
+              <a:rPr lang="en-GB" dirty="0" smtClean="0"/>
+              <a:t>What are you waiting for?</a:t>
+            </a:r>
+            <a:endParaRPr lang="en-GB" dirty="0"/>
+          </a:p>
+        </p:txBody>
+      </p:sp>
+      <p:sp>
+        <p:nvSpPr>
+          <p:cNvPr id="3" name="Content Placeholder 2"/>
+          <p:cNvSpPr>
+            <a:spLocks noGrp="1"/>
+          </p:cNvSpPr>
+          <p:nvPr>
+            <p:ph idx="1"/>
+          </p:nvPr>
+        </p:nvSpPr>
+        <p:spPr/>
+        <p:txBody>
+          <a:bodyPr/>
+          <a:lstStyle/>
+          <a:p>
+            <a:r>
+              <a:rPr lang="en-GB" dirty="0" smtClean="0"/>
+              <a:t>Play today!</a:t>
+            </a:r>
+          </a:p>
+          <a:p>
+            <a:r>
+              <a:rPr lang="en-GB" dirty="0"/>
+              <a:t>Git clone https://github.com/jackbo11/cm1101_team13_game.git</a:t>
+            </a:r>
+          </a:p>
+        </p:txBody>
+      </p:sp>
+    </p:spTree>
+    <p:extLst>
+      <p:ext uri="{BB962C8B-B14F-4D97-AF65-F5344CB8AC3E}">
+        <p14:creationId xmlns:p14="http://schemas.microsoft.com/office/powerpoint/2010/main" val="2336868997"/>
+      </p:ext>
+    </p:extLst>
+  </p:cSld>
+  <p:clrMapOvr>
+    <a:masterClrMapping/>
+  </p:clrMapOvr>
+</p:sld>
+</file>
+
 <file path=ppt/slides/slide2.xml><?xml version="1.0" encoding="utf-8"?>
 <p:sld xmlns:a="http://schemas.openxmlformats.org/drawingml/2006/main" xmlns:r="http://schemas.openxmlformats.org/officeDocument/2006/relationships" xmlns:p="http://schemas.openxmlformats.org/presentationml/2006/main">
   <p:cSld>

</xml_diff>

<commit_message>
Added picture of issue tracker to powerpoint
</commit_message>
<xml_diff>
--- a/A night out at the SU.pptx
+++ b/A night out at the SU.pptx
@@ -13,9 +13,10 @@
     <p:sldId id="263" r:id="rId7"/>
     <p:sldId id="264" r:id="rId8"/>
     <p:sldId id="266" r:id="rId9"/>
-    <p:sldId id="265" r:id="rId10"/>
-    <p:sldId id="260" r:id="rId11"/>
-    <p:sldId id="267" r:id="rId12"/>
+    <p:sldId id="268" r:id="rId10"/>
+    <p:sldId id="265" r:id="rId11"/>
+    <p:sldId id="260" r:id="rId12"/>
+    <p:sldId id="267" r:id="rId13"/>
   </p:sldIdLst>
   <p:sldSz cx="12192000" cy="6858000"/>
   <p:notesSz cx="6858000" cy="9144000"/>
@@ -6336,6 +6337,216 @@
           <a:chExt cx="0" cy="0"/>
         </a:xfrm>
       </p:grpSpPr>
+      <p:sp>
+        <p:nvSpPr>
+          <p:cNvPr id="2" name="Title 1"/>
+          <p:cNvSpPr>
+            <a:spLocks noGrp="1"/>
+          </p:cNvSpPr>
+          <p:nvPr>
+            <p:ph type="title"/>
+          </p:nvPr>
+        </p:nvSpPr>
+        <p:spPr>
+          <a:xfrm>
+            <a:off x="1497562" y="-255103"/>
+            <a:ext cx="10018713" cy="1752599"/>
+          </a:xfrm>
+        </p:spPr>
+        <p:txBody>
+          <a:bodyPr>
+            <a:normAutofit/>
+          </a:bodyPr>
+          <a:lstStyle/>
+          <a:p>
+            <a:r>
+              <a:rPr lang="en-GB" sz="5400" b="1" dirty="0">
+                <a:solidFill>
+                  <a:schemeClr val="accent4">
+                    <a:lumMod val="75000"/>
+                  </a:schemeClr>
+                </a:solidFill>
+              </a:rPr>
+              <a:t>Distribution of workload</a:t>
+            </a:r>
+          </a:p>
+        </p:txBody>
+      </p:sp>
+      <p:sp>
+        <p:nvSpPr>
+          <p:cNvPr id="3" name="Content Placeholder 2"/>
+          <p:cNvSpPr>
+            <a:spLocks noGrp="1"/>
+          </p:cNvSpPr>
+          <p:nvPr>
+            <p:ph idx="1"/>
+          </p:nvPr>
+        </p:nvSpPr>
+        <p:spPr>
+          <a:xfrm>
+            <a:off x="1802362" y="1285461"/>
+            <a:ext cx="10018713" cy="5234609"/>
+          </a:xfrm>
+        </p:spPr>
+        <p:txBody>
+          <a:bodyPr>
+            <a:normAutofit fontScale="77500" lnSpcReduction="20000"/>
+          </a:bodyPr>
+          <a:lstStyle/>
+          <a:p>
+            <a:pPr marL="0" indent="0">
+              <a:buNone/>
+            </a:pPr>
+            <a:r>
+              <a:rPr lang="en-GB" sz="4100" dirty="0">
+                <a:solidFill>
+                  <a:schemeClr val="accent4">
+                    <a:lumMod val="75000"/>
+                  </a:schemeClr>
+                </a:solidFill>
+              </a:rPr>
+              <a:t>Each team member was given individual tasks depending on their ability so that everybody played a role within the project. This also meant that the people with no coding experience could still participate.</a:t>
+            </a:r>
+          </a:p>
+          <a:p>
+            <a:r>
+              <a:rPr lang="en-GB" sz="4100" dirty="0">
+                <a:solidFill>
+                  <a:schemeClr val="accent4">
+                    <a:lumMod val="75000"/>
+                  </a:schemeClr>
+                </a:solidFill>
+              </a:rPr>
+              <a:t>Ring of fire - Will</a:t>
+            </a:r>
+          </a:p>
+          <a:p>
+            <a:r>
+              <a:rPr lang="en-GB" sz="4100" dirty="0">
+                <a:solidFill>
+                  <a:schemeClr val="accent4">
+                    <a:lumMod val="75000"/>
+                  </a:schemeClr>
+                </a:solidFill>
+              </a:rPr>
+              <a:t>Items, inventory </a:t>
+            </a:r>
+            <a:r>
+              <a:rPr lang="en-GB" sz="4100" dirty="0" err="1">
+                <a:solidFill>
+                  <a:schemeClr val="accent4">
+                    <a:lumMod val="75000"/>
+                  </a:schemeClr>
+                </a:solidFill>
+              </a:rPr>
+              <a:t>etc</a:t>
+            </a:r>
+            <a:r>
+              <a:rPr lang="en-GB" sz="4100" dirty="0">
+                <a:solidFill>
+                  <a:schemeClr val="accent4">
+                    <a:lumMod val="75000"/>
+                  </a:schemeClr>
+                </a:solidFill>
+              </a:rPr>
+              <a:t> - Christian + Ali</a:t>
+            </a:r>
+          </a:p>
+          <a:p>
+            <a:r>
+              <a:rPr lang="en-GB" sz="4100" dirty="0">
+                <a:solidFill>
+                  <a:schemeClr val="accent4">
+                    <a:lumMod val="75000"/>
+                  </a:schemeClr>
+                </a:solidFill>
+              </a:rPr>
+              <a:t>Resident genius - Jack</a:t>
+            </a:r>
+          </a:p>
+          <a:p>
+            <a:r>
+              <a:rPr lang="en-GB" sz="4100" dirty="0">
+                <a:solidFill>
+                  <a:schemeClr val="accent4">
+                    <a:lumMod val="75000"/>
+                  </a:schemeClr>
+                </a:solidFill>
+              </a:rPr>
+              <a:t>Presentation - Rebecca and Ellie</a:t>
+            </a:r>
+          </a:p>
+          <a:p>
+            <a:r>
+              <a:rPr lang="en-GB" sz="4100" dirty="0">
+                <a:solidFill>
+                  <a:schemeClr val="accent4">
+                    <a:lumMod val="75000"/>
+                  </a:schemeClr>
+                </a:solidFill>
+              </a:rPr>
+              <a:t>Poster – Rex</a:t>
+            </a:r>
+          </a:p>
+          <a:p>
+            <a:r>
+              <a:rPr lang="en-GB" sz="4100" dirty="0">
+                <a:solidFill>
+                  <a:schemeClr val="accent4">
+                    <a:lumMod val="75000"/>
+                  </a:schemeClr>
+                </a:solidFill>
+              </a:rPr>
+              <a:t>Map - Ivan</a:t>
+            </a:r>
+          </a:p>
+          <a:p>
+            <a:pPr marL="0" indent="0">
+              <a:buNone/>
+            </a:pPr>
+            <a:endParaRPr lang="en-GB" sz="3200" dirty="0">
+              <a:solidFill>
+                <a:schemeClr val="accent4">
+                  <a:lumMod val="75000"/>
+                </a:schemeClr>
+              </a:solidFill>
+            </a:endParaRPr>
+          </a:p>
+        </p:txBody>
+      </p:sp>
+    </p:spTree>
+    <p:extLst>
+      <p:ext uri="{BB962C8B-B14F-4D97-AF65-F5344CB8AC3E}">
+        <p14:creationId xmlns:p14="http://schemas.microsoft.com/office/powerpoint/2010/main" val="3543646472"/>
+      </p:ext>
+    </p:extLst>
+  </p:cSld>
+  <p:clrMapOvr>
+    <a:masterClrMapping/>
+  </p:clrMapOvr>
+  <p:transition spd="slow">
+    <p:push dir="u"/>
+  </p:transition>
+</p:sld>
+</file>
+
+<file path=ppt/slides/slide11.xml><?xml version="1.0" encoding="utf-8"?>
+<p:sld xmlns:a="http://schemas.openxmlformats.org/drawingml/2006/main" xmlns:r="http://schemas.openxmlformats.org/officeDocument/2006/relationships" xmlns:p="http://schemas.openxmlformats.org/presentationml/2006/main">
+  <p:cSld>
+    <p:spTree>
+      <p:nvGrpSpPr>
+        <p:cNvPr id="1" name=""/>
+        <p:cNvGrpSpPr/>
+        <p:nvPr/>
+      </p:nvGrpSpPr>
+      <p:grpSpPr>
+        <a:xfrm>
+          <a:off x="0" y="0"/>
+          <a:ext cx="0" cy="0"/>
+          <a:chOff x="0" y="0"/>
+          <a:chExt cx="0" cy="0"/>
+        </a:xfrm>
+      </p:grpSpPr>
       <p:pic>
         <p:nvPicPr>
           <p:cNvPr id="4" name="Content Placeholder 3"/>
@@ -6378,7 +6589,7 @@
 </p:sld>
 </file>
 
-<file path=ppt/slides/slide11.xml><?xml version="1.0" encoding="utf-8"?>
+<file path=ppt/slides/slide12.xml><?xml version="1.0" encoding="utf-8"?>
 <p:sld xmlns:a="http://schemas.openxmlformats.org/drawingml/2006/main" xmlns:r="http://schemas.openxmlformats.org/officeDocument/2006/relationships" xmlns:p="http://schemas.openxmlformats.org/presentationml/2006/main">
   <p:cSld>
     <p:spTree>
@@ -7420,186 +7631,54 @@
             <p:ph type="title"/>
           </p:nvPr>
         </p:nvSpPr>
+        <p:spPr/>
+        <p:txBody>
+          <a:bodyPr/>
+          <a:lstStyle/>
+          <a:p>
+            <a:endParaRPr lang="en-GB" dirty="0"/>
+          </a:p>
+        </p:txBody>
+      </p:sp>
+      <p:pic>
+        <p:nvPicPr>
+          <p:cNvPr id="6" name="Content Placeholder 5" descr="Screen Clipping"/>
+          <p:cNvPicPr>
+            <a:picLocks noGrp="1" noChangeAspect="1"/>
+          </p:cNvPicPr>
+          <p:nvPr>
+            <p:ph idx="1"/>
+          </p:nvPr>
+        </p:nvPicPr>
+        <p:blipFill>
+          <a:blip r:embed="rId2">
+            <a:extLst>
+              <a:ext uri="{28A0092B-C50C-407E-A947-70E740481C1C}">
+                <a14:useLocalDpi xmlns:a14="http://schemas.microsoft.com/office/drawing/2010/main" val="0"/>
+              </a:ext>
+            </a:extLst>
+          </a:blip>
+          <a:stretch>
+            <a:fillRect/>
+          </a:stretch>
+        </p:blipFill>
         <p:spPr>
           <a:xfrm>
-            <a:off x="1497562" y="-255103"/>
-            <a:ext cx="10018713" cy="1752599"/>
+            <a:off x="3139440" y="962292"/>
+            <a:ext cx="7959006" cy="5590908"/>
           </a:xfrm>
         </p:spPr>
-        <p:txBody>
-          <a:bodyPr>
-            <a:normAutofit/>
-          </a:bodyPr>
-          <a:lstStyle/>
-          <a:p>
-            <a:r>
-              <a:rPr lang="en-GB" sz="5400" b="1" dirty="0">
-                <a:solidFill>
-                  <a:schemeClr val="accent4">
-                    <a:lumMod val="75000"/>
-                  </a:schemeClr>
-                </a:solidFill>
-              </a:rPr>
-              <a:t>Distribution of workload</a:t>
-            </a:r>
-          </a:p>
-        </p:txBody>
-      </p:sp>
-      <p:sp>
-        <p:nvSpPr>
-          <p:cNvPr id="3" name="Content Placeholder 2"/>
-          <p:cNvSpPr>
-            <a:spLocks noGrp="1"/>
-          </p:cNvSpPr>
-          <p:nvPr>
-            <p:ph idx="1"/>
-          </p:nvPr>
-        </p:nvSpPr>
-        <p:spPr>
-          <a:xfrm>
-            <a:off x="1802362" y="1285461"/>
-            <a:ext cx="10018713" cy="5234609"/>
-          </a:xfrm>
-        </p:spPr>
-        <p:txBody>
-          <a:bodyPr>
-            <a:normAutofit fontScale="77500" lnSpcReduction="20000"/>
-          </a:bodyPr>
-          <a:lstStyle/>
-          <a:p>
-            <a:pPr marL="0" indent="0">
-              <a:buNone/>
-            </a:pPr>
-            <a:r>
-              <a:rPr lang="en-GB" sz="4100" dirty="0">
-                <a:solidFill>
-                  <a:schemeClr val="accent4">
-                    <a:lumMod val="75000"/>
-                  </a:schemeClr>
-                </a:solidFill>
-              </a:rPr>
-              <a:t>Each team member was given individual tasks depending on their ability so that everybody played a role within the project. This also meant that the people with no coding experience could still participate.</a:t>
-            </a:r>
-          </a:p>
-          <a:p>
-            <a:r>
-              <a:rPr lang="en-GB" sz="4100" dirty="0">
-                <a:solidFill>
-                  <a:schemeClr val="accent4">
-                    <a:lumMod val="75000"/>
-                  </a:schemeClr>
-                </a:solidFill>
-              </a:rPr>
-              <a:t>Ring of fire - Will</a:t>
-            </a:r>
-          </a:p>
-          <a:p>
-            <a:r>
-              <a:rPr lang="en-GB" sz="4100" dirty="0">
-                <a:solidFill>
-                  <a:schemeClr val="accent4">
-                    <a:lumMod val="75000"/>
-                  </a:schemeClr>
-                </a:solidFill>
-              </a:rPr>
-              <a:t>Items, inventory </a:t>
-            </a:r>
-            <a:r>
-              <a:rPr lang="en-GB" sz="4100" dirty="0" err="1">
-                <a:solidFill>
-                  <a:schemeClr val="accent4">
-                    <a:lumMod val="75000"/>
-                  </a:schemeClr>
-                </a:solidFill>
-              </a:rPr>
-              <a:t>etc</a:t>
-            </a:r>
-            <a:r>
-              <a:rPr lang="en-GB" sz="4100" dirty="0">
-                <a:solidFill>
-                  <a:schemeClr val="accent4">
-                    <a:lumMod val="75000"/>
-                  </a:schemeClr>
-                </a:solidFill>
-              </a:rPr>
-              <a:t> - Christian + Ali</a:t>
-            </a:r>
-          </a:p>
-          <a:p>
-            <a:r>
-              <a:rPr lang="en-GB" sz="4100" dirty="0">
-                <a:solidFill>
-                  <a:schemeClr val="accent4">
-                    <a:lumMod val="75000"/>
-                  </a:schemeClr>
-                </a:solidFill>
-              </a:rPr>
-              <a:t>Resident genius - Jack</a:t>
-            </a:r>
-          </a:p>
-          <a:p>
-            <a:r>
-              <a:rPr lang="en-GB" sz="4100" dirty="0">
-                <a:solidFill>
-                  <a:schemeClr val="accent4">
-                    <a:lumMod val="75000"/>
-                  </a:schemeClr>
-                </a:solidFill>
-              </a:rPr>
-              <a:t>Presentation - Rebecca and Ellie</a:t>
-            </a:r>
-          </a:p>
-          <a:p>
-            <a:r>
-              <a:rPr lang="en-GB" sz="4100" dirty="0">
-                <a:solidFill>
-                  <a:schemeClr val="accent4">
-                    <a:lumMod val="75000"/>
-                  </a:schemeClr>
-                </a:solidFill>
-              </a:rPr>
-              <a:t>Poster – Rex</a:t>
-            </a:r>
-          </a:p>
-          <a:p>
-            <a:r>
-              <a:rPr lang="en-GB" sz="4100" dirty="0">
-                <a:solidFill>
-                  <a:schemeClr val="accent4">
-                    <a:lumMod val="75000"/>
-                  </a:schemeClr>
-                </a:solidFill>
-              </a:rPr>
-              <a:t>Map - Ivan</a:t>
-            </a:r>
-          </a:p>
-          <a:p>
-            <a:pPr marL="0" indent="0">
-              <a:buNone/>
-            </a:pPr>
-            <a:endParaRPr lang="en-GB" sz="3200" dirty="0">
-              <a:solidFill>
-                <a:schemeClr val="accent4">
-                  <a:lumMod val="75000"/>
-                </a:schemeClr>
-              </a:solidFill>
-            </a:endParaRPr>
-          </a:p>
-        </p:txBody>
-      </p:sp>
+      </p:pic>
     </p:spTree>
     <p:extLst>
       <p:ext uri="{BB962C8B-B14F-4D97-AF65-F5344CB8AC3E}">
-        <p14:creationId xmlns:p14="http://schemas.microsoft.com/office/powerpoint/2010/main" val="3543646472"/>
+        <p14:creationId xmlns:p14="http://schemas.microsoft.com/office/powerpoint/2010/main" val="3911252559"/>
       </p:ext>
     </p:extLst>
   </p:cSld>
   <p:clrMapOvr>
     <a:masterClrMapping/>
   </p:clrMapOvr>
-  <p:transition spd="slow">
-    <p:push dir="u"/>
-  </p:transition>
 </p:sld>
 </file>
 

</xml_diff>